<commit_message>
PPTx angepasst (Format und Farbe)
</commit_message>
<xml_diff>
--- a/Documentation/Steinschlagrisiko_Flussdiagramam.pptx
+++ b/Documentation/Steinschlagrisiko_Flussdiagramam.pptx
@@ -243,7 +243,7 @@
           <a:p>
             <a:fld id="{EA19E4FC-2C7B-E143-A0F9-E8CB5B875522}" type="datetimeFigureOut">
               <a:rPr lang="de-DE" smtClean="0"/>
-              <a:t>22.10.23</a:t>
+              <a:t>02.11.23</a:t>
             </a:fld>
             <a:endParaRPr lang="de-DE"/>
           </a:p>
@@ -413,7 +413,7 @@
           <a:p>
             <a:fld id="{EA19E4FC-2C7B-E143-A0F9-E8CB5B875522}" type="datetimeFigureOut">
               <a:rPr lang="de-DE" smtClean="0"/>
-              <a:t>22.10.23</a:t>
+              <a:t>02.11.23</a:t>
             </a:fld>
             <a:endParaRPr lang="de-DE"/>
           </a:p>
@@ -593,7 +593,7 @@
           <a:p>
             <a:fld id="{EA19E4FC-2C7B-E143-A0F9-E8CB5B875522}" type="datetimeFigureOut">
               <a:rPr lang="de-DE" smtClean="0"/>
-              <a:t>22.10.23</a:t>
+              <a:t>02.11.23</a:t>
             </a:fld>
             <a:endParaRPr lang="de-DE"/>
           </a:p>
@@ -763,7 +763,7 @@
           <a:p>
             <a:fld id="{EA19E4FC-2C7B-E143-A0F9-E8CB5B875522}" type="datetimeFigureOut">
               <a:rPr lang="de-DE" smtClean="0"/>
-              <a:t>22.10.23</a:t>
+              <a:t>02.11.23</a:t>
             </a:fld>
             <a:endParaRPr lang="de-DE"/>
           </a:p>
@@ -1007,7 +1007,7 @@
           <a:p>
             <a:fld id="{EA19E4FC-2C7B-E143-A0F9-E8CB5B875522}" type="datetimeFigureOut">
               <a:rPr lang="de-DE" smtClean="0"/>
-              <a:t>22.10.23</a:t>
+              <a:t>02.11.23</a:t>
             </a:fld>
             <a:endParaRPr lang="de-DE"/>
           </a:p>
@@ -1239,7 +1239,7 @@
           <a:p>
             <a:fld id="{EA19E4FC-2C7B-E143-A0F9-E8CB5B875522}" type="datetimeFigureOut">
               <a:rPr lang="de-DE" smtClean="0"/>
-              <a:t>22.10.23</a:t>
+              <a:t>02.11.23</a:t>
             </a:fld>
             <a:endParaRPr lang="de-DE"/>
           </a:p>
@@ -1606,7 +1606,7 @@
           <a:p>
             <a:fld id="{EA19E4FC-2C7B-E143-A0F9-E8CB5B875522}" type="datetimeFigureOut">
               <a:rPr lang="de-DE" smtClean="0"/>
-              <a:t>22.10.23</a:t>
+              <a:t>02.11.23</a:t>
             </a:fld>
             <a:endParaRPr lang="de-DE"/>
           </a:p>
@@ -1724,7 +1724,7 @@
           <a:p>
             <a:fld id="{EA19E4FC-2C7B-E143-A0F9-E8CB5B875522}" type="datetimeFigureOut">
               <a:rPr lang="de-DE" smtClean="0"/>
-              <a:t>22.10.23</a:t>
+              <a:t>02.11.23</a:t>
             </a:fld>
             <a:endParaRPr lang="de-DE"/>
           </a:p>
@@ -1819,7 +1819,7 @@
           <a:p>
             <a:fld id="{EA19E4FC-2C7B-E143-A0F9-E8CB5B875522}" type="datetimeFigureOut">
               <a:rPr lang="de-DE" smtClean="0"/>
-              <a:t>22.10.23</a:t>
+              <a:t>02.11.23</a:t>
             </a:fld>
             <a:endParaRPr lang="de-DE"/>
           </a:p>
@@ -2096,7 +2096,7 @@
           <a:p>
             <a:fld id="{EA19E4FC-2C7B-E143-A0F9-E8CB5B875522}" type="datetimeFigureOut">
               <a:rPr lang="de-DE" smtClean="0"/>
-              <a:t>22.10.23</a:t>
+              <a:t>02.11.23</a:t>
             </a:fld>
             <a:endParaRPr lang="de-DE"/>
           </a:p>
@@ -2353,7 +2353,7 @@
           <a:p>
             <a:fld id="{EA19E4FC-2C7B-E143-A0F9-E8CB5B875522}" type="datetimeFigureOut">
               <a:rPr lang="de-DE" smtClean="0"/>
-              <a:t>22.10.23</a:t>
+              <a:t>02.11.23</a:t>
             </a:fld>
             <a:endParaRPr lang="de-DE"/>
           </a:p>
@@ -2566,7 +2566,7 @@
           <a:p>
             <a:fld id="{EA19E4FC-2C7B-E143-A0F9-E8CB5B875522}" type="datetimeFigureOut">
               <a:rPr lang="de-DE" smtClean="0"/>
-              <a:t>22.10.23</a:t>
+              <a:t>02.11.23</a:t>
             </a:fld>
             <a:endParaRPr lang="de-DE"/>
           </a:p>
@@ -2991,6 +2991,11 @@
           <a:prstGeom prst="ellipse">
             <a:avLst/>
           </a:prstGeom>
+          <a:solidFill>
+            <a:schemeClr val="bg1">
+              <a:lumMod val="95000"/>
+            </a:schemeClr>
+          </a:solidFill>
         </p:spPr>
         <p:style>
           <a:lnRef idx="2">
@@ -3048,6 +3053,11 @@
               <a:prstGeom prst="flowChartDecision">
                 <a:avLst/>
               </a:prstGeom>
+              <a:solidFill>
+                <a:schemeClr val="bg1">
+                  <a:lumMod val="95000"/>
+                </a:schemeClr>
+              </a:solidFill>
             </p:spPr>
             <p:style>
               <a:lnRef idx="2">
@@ -3183,6 +3193,11 @@
           <a:prstGeom prst="flowChartAlternateProcess">
             <a:avLst/>
           </a:prstGeom>
+          <a:solidFill>
+            <a:schemeClr val="bg1">
+              <a:lumMod val="95000"/>
+            </a:schemeClr>
+          </a:solidFill>
         </p:spPr>
         <p:style>
           <a:lnRef idx="2">
@@ -3375,7 +3390,11 @@
           <a:prstGeom prst="rect">
             <a:avLst/>
           </a:prstGeom>
-          <a:noFill/>
+          <a:solidFill>
+            <a:schemeClr val="bg1">
+              <a:lumMod val="95000"/>
+            </a:schemeClr>
+          </a:solidFill>
         </p:spPr>
         <p:txBody>
           <a:bodyPr wrap="square" rtlCol="0">
@@ -3415,6 +3434,11 @@
               <a:prstGeom prst="flowChartDecision">
                 <a:avLst/>
               </a:prstGeom>
+              <a:solidFill>
+                <a:schemeClr val="bg1">
+                  <a:lumMod val="95000"/>
+                </a:schemeClr>
+              </a:solidFill>
             </p:spPr>
             <p:style>
               <a:lnRef idx="2">
@@ -3586,7 +3610,11 @@
           <a:prstGeom prst="rect">
             <a:avLst/>
           </a:prstGeom>
-          <a:noFill/>
+          <a:solidFill>
+            <a:schemeClr val="bg1">
+              <a:lumMod val="95000"/>
+            </a:schemeClr>
+          </a:solidFill>
         </p:spPr>
         <p:txBody>
           <a:bodyPr wrap="square" rtlCol="0">
@@ -3624,6 +3652,11 @@
           <a:prstGeom prst="flowChartAlternateProcess">
             <a:avLst/>
           </a:prstGeom>
+          <a:solidFill>
+            <a:schemeClr val="bg1">
+              <a:lumMod val="95000"/>
+            </a:schemeClr>
+          </a:solidFill>
         </p:spPr>
         <p:style>
           <a:lnRef idx="2">
@@ -3773,6 +3806,11 @@
               <a:prstGeom prst="flowChartDecision">
                 <a:avLst/>
               </a:prstGeom>
+              <a:solidFill>
+                <a:schemeClr val="bg1">
+                  <a:lumMod val="95000"/>
+                </a:schemeClr>
+              </a:solidFill>
             </p:spPr>
             <p:style>
               <a:lnRef idx="2">
@@ -3899,6 +3937,11 @@
           <a:prstGeom prst="flowChartAlternateProcess">
             <a:avLst/>
           </a:prstGeom>
+          <a:solidFill>
+            <a:schemeClr val="bg1">
+              <a:lumMod val="95000"/>
+            </a:schemeClr>
+          </a:solidFill>
         </p:spPr>
         <p:style>
           <a:lnRef idx="2">
@@ -4000,7 +4043,11 @@
           <a:prstGeom prst="rect">
             <a:avLst/>
           </a:prstGeom>
-          <a:noFill/>
+          <a:solidFill>
+            <a:schemeClr val="bg1">
+              <a:lumMod val="95000"/>
+            </a:schemeClr>
+          </a:solidFill>
         </p:spPr>
         <p:txBody>
           <a:bodyPr wrap="square" rtlCol="0">
@@ -4038,7 +4085,11 @@
           <a:prstGeom prst="rect">
             <a:avLst/>
           </a:prstGeom>
-          <a:noFill/>
+          <a:solidFill>
+            <a:schemeClr val="bg1">
+              <a:lumMod val="95000"/>
+            </a:schemeClr>
+          </a:solidFill>
         </p:spPr>
         <p:txBody>
           <a:bodyPr wrap="square" rtlCol="0">
@@ -4122,6 +4173,11 @@
           <a:prstGeom prst="flowChartAlternateProcess">
             <a:avLst/>
           </a:prstGeom>
+          <a:solidFill>
+            <a:schemeClr val="bg1">
+              <a:lumMod val="95000"/>
+            </a:schemeClr>
+          </a:solidFill>
         </p:spPr>
         <p:style>
           <a:lnRef idx="2">
@@ -4177,6 +4233,11 @@
           <a:prstGeom prst="flowChartDecision">
             <a:avLst/>
           </a:prstGeom>
+          <a:solidFill>
+            <a:schemeClr val="bg1">
+              <a:lumMod val="95000"/>
+            </a:schemeClr>
+          </a:solidFill>
         </p:spPr>
         <p:style>
           <a:lnRef idx="2">
@@ -4320,7 +4381,11 @@
           <a:prstGeom prst="rect">
             <a:avLst/>
           </a:prstGeom>
-          <a:noFill/>
+          <a:solidFill>
+            <a:schemeClr val="bg1">
+              <a:lumMod val="95000"/>
+            </a:schemeClr>
+          </a:solidFill>
         </p:spPr>
         <p:txBody>
           <a:bodyPr wrap="square" rtlCol="0">
@@ -4360,6 +4425,11 @@
               <a:prstGeom prst="flowChartDecision">
                 <a:avLst/>
               </a:prstGeom>
+              <a:solidFill>
+                <a:schemeClr val="bg1">
+                  <a:lumMod val="95000"/>
+                </a:schemeClr>
+              </a:solidFill>
             </p:spPr>
             <p:style>
               <a:lnRef idx="2">
@@ -4505,7 +4575,11 @@
           <a:prstGeom prst="rect">
             <a:avLst/>
           </a:prstGeom>
-          <a:noFill/>
+          <a:solidFill>
+            <a:schemeClr val="bg1">
+              <a:lumMod val="95000"/>
+            </a:schemeClr>
+          </a:solidFill>
         </p:spPr>
         <p:txBody>
           <a:bodyPr wrap="square" rtlCol="0">
@@ -4544,7 +4618,9 @@
             <a:avLst/>
           </a:prstGeom>
           <a:solidFill>
-            <a:srgbClr val="00B050"/>
+            <a:schemeClr val="bg1">
+              <a:lumMod val="95000"/>
+            </a:schemeClr>
           </a:solidFill>
         </p:spPr>
         <p:style>
@@ -4601,7 +4677,11 @@
           <a:prstGeom prst="rect">
             <a:avLst/>
           </a:prstGeom>
-          <a:noFill/>
+          <a:solidFill>
+            <a:schemeClr val="bg1">
+              <a:lumMod val="95000"/>
+            </a:schemeClr>
+          </a:solidFill>
         </p:spPr>
         <p:txBody>
           <a:bodyPr wrap="square" rtlCol="0">
@@ -4693,7 +4773,9 @@
             <a:avLst/>
           </a:prstGeom>
           <a:solidFill>
-            <a:srgbClr val="FF0000"/>
+            <a:schemeClr val="bg1">
+              <a:lumMod val="95000"/>
+            </a:schemeClr>
           </a:solidFill>
         </p:spPr>
         <p:style>
@@ -4886,7 +4968,11 @@
           <a:prstGeom prst="rect">
             <a:avLst/>
           </a:prstGeom>
-          <a:noFill/>
+          <a:solidFill>
+            <a:schemeClr val="bg1">
+              <a:lumMod val="95000"/>
+            </a:schemeClr>
+          </a:solidFill>
         </p:spPr>
         <p:txBody>
           <a:bodyPr wrap="square" rtlCol="0">
@@ -4931,7 +5017,11 @@
           <a:prstGeom prst="rect">
             <a:avLst/>
           </a:prstGeom>
-          <a:noFill/>
+          <a:solidFill>
+            <a:schemeClr val="bg1">
+              <a:lumMod val="95000"/>
+            </a:schemeClr>
+          </a:solidFill>
         </p:spPr>
         <p:txBody>
           <a:bodyPr wrap="square" rtlCol="0">
@@ -4940,7 +5030,7 @@
           <a:lstStyle/>
           <a:p>
             <a:r>
-              <a:rPr lang="de-DE" sz="2000" b="1" u="sng" dirty="0">
+              <a:rPr lang="de-DE" sz="2000" dirty="0">
                 <a:latin typeface="Arial" panose="020B0604020202020204" pitchFamily="34" charset="0"/>
                 <a:cs typeface="Arial" panose="020B0604020202020204" pitchFamily="34" charset="0"/>
               </a:rPr>
@@ -5015,7 +5105,11 @@
           <a:prstGeom prst="rect">
             <a:avLst/>
           </a:prstGeom>
-          <a:noFill/>
+          <a:solidFill>
+            <a:schemeClr val="bg1">
+              <a:lumMod val="95000"/>
+            </a:schemeClr>
+          </a:solidFill>
         </p:spPr>
         <p:txBody>
           <a:bodyPr wrap="square" rtlCol="0">
@@ -5100,7 +5194,11 @@
           <a:prstGeom prst="rect">
             <a:avLst/>
           </a:prstGeom>
-          <a:noFill/>
+          <a:solidFill>
+            <a:schemeClr val="bg1">
+              <a:lumMod val="95000"/>
+            </a:schemeClr>
+          </a:solidFill>
         </p:spPr>
         <p:txBody>
           <a:bodyPr wrap="square" rtlCol="0">

</xml_diff>